<commit_message>
Fix alignment on measurement diagram
Signed-off-by: Avery Blanchard <avery-blanchard@proton.me>
</commit_message>
<xml_diff>
--- a/LPC-Containers.pptx
+++ b/LPC-Containers.pptx
@@ -159,7 +159,7 @@
 <file path=ppt/revisionInfo.xml><?xml version="1.0" encoding="utf-8"?>
 <p1510:revInfo xmlns:a="http://schemas.openxmlformats.org/drawingml/2006/main" xmlns:r="http://schemas.openxmlformats.org/officeDocument/2006/relationships" xmlns:p1510="http://schemas.microsoft.com/office/powerpoint/2015/10/main">
   <p1510:revLst>
-    <p1510:client id="{02854765-6D3C-0AFB-7E2E-E86E2CC1665C}" v="1953" dt="2023-11-08T21:10:29.466"/>
+    <p1510:client id="{02854765-6D3C-0AFB-7E2E-E86E2CC1665C}" v="1961" dt="2023-11-08T21:16:42.744"/>
     <p1510:client id="{B2BB5A0C-21F3-4E5A-96CB-27F806E517F4}" v="1839" dt="2023-11-08T02:51:35.412"/>
   </p1510:revLst>
 </p1510:revInfo>
@@ -24929,7 +24929,7 @@
         <p:spPr>
           <a:xfrm>
             <a:off x="6354536" y="4225017"/>
-            <a:ext cx="5456463" cy="312962"/>
+            <a:ext cx="5548516" cy="287392"/>
           </a:xfrm>
           <a:prstGeom prst="rect">
             <a:avLst/>
@@ -24986,8 +24986,8 @@
         </p:nvSpPr>
         <p:spPr>
           <a:xfrm>
-            <a:off x="6354535" y="5055053"/>
-            <a:ext cx="5456463" cy="312962"/>
+            <a:off x="6385220" y="5065280"/>
+            <a:ext cx="5620114" cy="282278"/>
           </a:xfrm>
           <a:prstGeom prst="rect">
             <a:avLst/>
@@ -25022,16 +25022,9 @@
                 <a:ea typeface="+mn-lt"/>
                 <a:cs typeface="+mn-lt"/>
               </a:rPr>
-              <a:t>sha256:</a:t>
-            </a:r>
-            <a:r>
-              <a:rPr lang="en-US" sz="1200" dirty="0">
-                <a:ea typeface="+mn-lt"/>
-                <a:cs typeface="+mn-lt"/>
-              </a:rPr>
-              <a:t>a97b84e295de545881d2915211fe240589b2475d90025e61acf7206a2c17a057</a:t>
-            </a:r>
-            <a:endParaRPr lang="en-US" dirty="0">
+              <a:t>sha256:a97b84e295de545881d2915211fe240589b2475d90025e61acf7206a2c17a057</a:t>
+            </a:r>
+            <a:endParaRPr lang="en-US" b="1" dirty="0">
               <a:cs typeface="Calibri" panose="020F0502020204030204"/>
             </a:endParaRPr>
           </a:p>

</xml_diff>